<commit_message>
Update cenk presentation and review
</commit_message>
<xml_diff>
--- a/recipe_generation/PresentationCenk.pptx
+++ b/recipe_generation/PresentationCenk.pptx
@@ -5,14 +5,15 @@
     <p:sldMasterId id="2147483660" r:id="rId1"/>
   </p:sldMasterIdLst>
   <p:notesMasterIdLst>
-    <p:notesMasterId r:id="rId7"/>
+    <p:notesMasterId r:id="rId8"/>
   </p:notesMasterIdLst>
   <p:sldIdLst>
     <p:sldId id="256" r:id="rId2"/>
-    <p:sldId id="257" r:id="rId3"/>
-    <p:sldId id="258" r:id="rId4"/>
-    <p:sldId id="259" r:id="rId5"/>
-    <p:sldId id="260" r:id="rId6"/>
+    <p:sldId id="261" r:id="rId3"/>
+    <p:sldId id="257" r:id="rId4"/>
+    <p:sldId id="258" r:id="rId5"/>
+    <p:sldId id="259" r:id="rId6"/>
+    <p:sldId id="260" r:id="rId7"/>
   </p:sldIdLst>
   <p:sldSz cx="12192000" cy="6858000"/>
   <p:notesSz cx="6858000" cy="9144000"/>
@@ -119,6 +120,12 @@
 </p:presentation>
 </file>
 
+<file path=ppt/authors.xml><?xml version="1.0" encoding="utf-8"?>
+<p188:authorLst xmlns:a="http://schemas.openxmlformats.org/drawingml/2006/main" xmlns:r="http://schemas.openxmlformats.org/officeDocument/2006/relationships" xmlns:p188="http://schemas.microsoft.com/office/powerpoint/2018/8/main">
+  <p188:author id="{55030633-4757-97B9-B860-0B6DF96F043A}" name="Emrah Kaya" initials="EK" userId="4b6d218c2f2caa0e" providerId="Windows Live"/>
+</p188:authorLst>
+</file>
+
 <file path=ppt/revisionInfo.xml><?xml version="1.0" encoding="utf-8"?>
 <p1510:revInfo xmlns:a="http://schemas.openxmlformats.org/drawingml/2006/main" xmlns:r="http://schemas.openxmlformats.org/officeDocument/2006/relationships" xmlns:p1510="http://schemas.microsoft.com/office/powerpoint/2015/10/main">
   <p1510:revLst>
@@ -127,6 +134,290 @@
     <p1510:client id="{BD691E90-DF48-2D57-AEED-23FD83E53F02}" v="297" dt="2024-01-17T12:17:22.402"/>
   </p1510:revLst>
 </p1510:revInfo>
+</file>
+
+<file path=ppt/comments/modernComment_101_7438C28C.xml><?xml version="1.0" encoding="utf-8"?>
+<p188:cmLst xmlns:a="http://schemas.openxmlformats.org/drawingml/2006/main" xmlns:r="http://schemas.openxmlformats.org/officeDocument/2006/relationships" xmlns:p188="http://schemas.microsoft.com/office/powerpoint/2018/8/main">
+  <p188:cm id="{1F230187-417E-4AA7-B361-DB8C25AD58CA}" authorId="{55030633-4757-97B9-B860-0B6DF96F043A}" created="2024-01-18T11:54:07.913">
+    <ac:txMkLst xmlns:ac="http://schemas.microsoft.com/office/drawing/2013/main/command">
+      <pc:docMk xmlns:pc="http://schemas.microsoft.com/office/powerpoint/2013/main/command"/>
+      <pc:sldMk xmlns:pc="http://schemas.microsoft.com/office/powerpoint/2013/main/command" cId="1949876876" sldId="257"/>
+      <ac:spMk id="3" creationId="{50CBCE6E-BB4B-250B-6606-B740C1B2B1E0}"/>
+      <ac:txMk cp="165" len="31">
+        <ac:context len="217" hash="1661871614"/>
+      </ac:txMk>
+    </ac:txMkLst>
+    <p188:pos x="4394703" y="2390614"/>
+    <p188:txBody>
+      <a:bodyPr/>
+      <a:lstStyle/>
+      <a:p>
+        <a:r>
+          <a:rPr lang="en-US"/>
+          <a:t>No code</a:t>
+        </a:r>
+      </a:p>
+    </p188:txBody>
+  </p188:cm>
+  <p188:cm id="{93B8660A-21C4-47E3-9958-2DF885F0305E}" authorId="{55030633-4757-97B9-B860-0B6DF96F043A}" created="2024-01-18T11:54:40.839">
+    <ac:deMkLst xmlns:ac="http://schemas.microsoft.com/office/drawing/2013/main/command">
+      <pc:docMk xmlns:pc="http://schemas.microsoft.com/office/powerpoint/2013/main/command"/>
+      <pc:sldMk xmlns:pc="http://schemas.microsoft.com/office/powerpoint/2013/main/command" cId="1949876876" sldId="257"/>
+      <ac:picMk id="4" creationId="{7EC82525-66A4-84BC-30F5-50984BCD9642}"/>
+    </ac:deMkLst>
+    <p188:txBody>
+      <a:bodyPr/>
+      <a:lstStyle/>
+      <a:p>
+        <a:r>
+          <a:rPr lang="en-US"/>
+          <a:t>You may Azure services to the top/bottom</a:t>
+        </a:r>
+      </a:p>
+    </p188:txBody>
+  </p188:cm>
+  <p188:cm id="{3FB83BF6-EF7F-4418-A3B6-08F1C663F0E9}" authorId="{55030633-4757-97B9-B860-0B6DF96F043A}" created="2024-01-18T11:56:12.805">
+    <ac:deMkLst xmlns:ac="http://schemas.microsoft.com/office/drawing/2013/main/command">
+      <pc:docMk xmlns:pc="http://schemas.microsoft.com/office/powerpoint/2013/main/command"/>
+      <pc:sldMk xmlns:pc="http://schemas.microsoft.com/office/powerpoint/2013/main/command" cId="1949876876" sldId="257"/>
+      <ac:picMk id="4" creationId="{7EC82525-66A4-84BC-30F5-50984BCD9642}"/>
+    </ac:deMkLst>
+    <p188:txBody>
+      <a:bodyPr/>
+      <a:lstStyle/>
+      <a:p>
+        <a:r>
+          <a:rPr lang="en-US"/>
+          <a:t>Put the whole picture of "Get and clean input" and color the boxes regarding the slide. I put it just for example. Make it free of outgoing arrows.
+You may resize (smaller) the user icon.</a:t>
+        </a:r>
+      </a:p>
+    </p188:txBody>
+  </p188:cm>
+</p188:cmLst>
+</file>
+
+<file path=ppt/comments/modernComment_102_DE5A0A1.xml><?xml version="1.0" encoding="utf-8"?>
+<p188:cmLst xmlns:a="http://schemas.openxmlformats.org/drawingml/2006/main" xmlns:r="http://schemas.openxmlformats.org/officeDocument/2006/relationships" xmlns:p188="http://schemas.microsoft.com/office/powerpoint/2018/8/main">
+  <p188:cm id="{59169EFE-C8BD-458C-B871-782A18D9E01A}" authorId="{55030633-4757-97B9-B860-0B6DF96F043A}" created="2024-01-18T11:59:27.591">
+    <ac:txMkLst xmlns:ac="http://schemas.microsoft.com/office/drawing/2013/main/command">
+      <pc:docMk xmlns:pc="http://schemas.microsoft.com/office/powerpoint/2013/main/command"/>
+      <pc:sldMk xmlns:pc="http://schemas.microsoft.com/office/powerpoint/2013/main/command" cId="233152673" sldId="258"/>
+      <ac:spMk id="3" creationId="{ACF65D12-C54B-50DD-D0C2-4E6845AA70E3}"/>
+      <ac:txMk cp="68" len="14">
+        <ac:context len="283" hash="1739650662"/>
+      </ac:txMk>
+    </ac:txMkLst>
+    <p188:pos x="4467131" y="588974"/>
+    <p188:txBody>
+      <a:bodyPr/>
+      <a:lstStyle/>
+      <a:p>
+        <a:r>
+          <a:rPr lang="en-US"/>
+          <a:t>Number of servings, or servings. Whichever suits best</a:t>
+        </a:r>
+      </a:p>
+    </p188:txBody>
+  </p188:cm>
+  <p188:cm id="{D5BD3C88-EDF2-492F-8FE7-0F5BDE8520C9}" authorId="{55030633-4757-97B9-B860-0B6DF96F043A}" created="2024-01-18T12:01:01.591">
+    <ac:txMkLst xmlns:ac="http://schemas.microsoft.com/office/drawing/2013/main/command">
+      <pc:docMk xmlns:pc="http://schemas.microsoft.com/office/powerpoint/2013/main/command"/>
+      <pc:sldMk xmlns:pc="http://schemas.microsoft.com/office/powerpoint/2013/main/command" cId="233152673" sldId="258"/>
+      <ac:spMk id="3" creationId="{ACF65D12-C54B-50DD-D0C2-4E6845AA70E3}"/>
+      <ac:txMk cp="108" len="30">
+        <ac:context len="283" hash="1739650662"/>
+      </ac:txMk>
+    </ac:txMkLst>
+    <p188:pos x="4258901" y="923952"/>
+    <p188:txBody>
+      <a:bodyPr/>
+      <a:lstStyle/>
+      <a:p>
+        <a:r>
+          <a:rPr lang="en-US"/>
+          <a:t>"It uses another AI agent to check if the user input matches the required content (dish name / number of servings)."</a:t>
+        </a:r>
+      </a:p>
+    </p188:txBody>
+  </p188:cm>
+  <p188:cm id="{D70A398E-46D2-4EDE-9464-07FD21C6FF26}" authorId="{55030633-4757-97B9-B860-0B6DF96F043A}" created="2024-01-18T12:01:30.954">
+    <ac:txMkLst xmlns:ac="http://schemas.microsoft.com/office/drawing/2013/main/command">
+      <pc:docMk xmlns:pc="http://schemas.microsoft.com/office/powerpoint/2013/main/command"/>
+      <pc:sldMk xmlns:pc="http://schemas.microsoft.com/office/powerpoint/2013/main/command" cId="233152673" sldId="258"/>
+      <ac:spMk id="3" creationId="{ACF65D12-C54B-50DD-D0C2-4E6845AA70E3}"/>
+      <ac:txMk cp="48" len="59">
+        <ac:context len="283" hash="1739650662"/>
+      </ac:txMk>
+    </ac:txMkLst>
+    <p188:pos x="7146956" y="588974"/>
+    <p188:txBody>
+      <a:bodyPr/>
+      <a:lstStyle/>
+      <a:p>
+        <a:r>
+          <a:rPr lang="en-US"/>
+          <a:t>Instead of "Clean", you may use "extract", "infer", etc.</a:t>
+        </a:r>
+      </a:p>
+    </p188:txBody>
+  </p188:cm>
+  <p188:cm id="{E374EF20-D983-4492-9216-E1EA5A51DFE5}" authorId="{55030633-4757-97B9-B860-0B6DF96F043A}" created="2024-01-18T12:03:42.565">
+    <ac:txMkLst xmlns:ac="http://schemas.microsoft.com/office/drawing/2013/main/command">
+      <pc:docMk xmlns:pc="http://schemas.microsoft.com/office/powerpoint/2013/main/command"/>
+      <pc:sldMk xmlns:pc="http://schemas.microsoft.com/office/powerpoint/2013/main/command" cId="233152673" sldId="258"/>
+      <ac:spMk id="3" creationId="{ACF65D12-C54B-50DD-D0C2-4E6845AA70E3}"/>
+      <ac:txMk cp="193" len="88">
+        <ac:context len="283" hash="1739650662"/>
+      </ac:txMk>
+    </ac:txMkLst>
+    <p188:pos x="9727194" y="1575802"/>
+    <p188:txBody>
+      <a:bodyPr/>
+      <a:lstStyle/>
+      <a:p>
+        <a:r>
+          <a:rPr lang="en-US"/>
+          <a:t>"It asks user continuosly until a valid input is entered. Once a valid dish name and number of servings are acquired from the user, the Recipe Generation step is executed."
+We don't give class names, variable names, etc. Just telling how the system works.</a:t>
+        </a:r>
+      </a:p>
+    </p188:txBody>
+  </p188:cm>
+</p188:cmLst>
+</file>
+
+<file path=ppt/comments/modernComment_103_182F298A.xml><?xml version="1.0" encoding="utf-8"?>
+<p188:cmLst xmlns:a="http://schemas.openxmlformats.org/drawingml/2006/main" xmlns:r="http://schemas.openxmlformats.org/officeDocument/2006/relationships" xmlns:p188="http://schemas.microsoft.com/office/powerpoint/2018/8/main">
+  <p188:cm id="{94ACEB46-1275-42C4-9F72-0E9786FE2710}" authorId="{55030633-4757-97B9-B860-0B6DF96F043A}" created="2024-01-18T12:04:57.513">
+    <ac:txMkLst xmlns:ac="http://schemas.microsoft.com/office/drawing/2013/main/command">
+      <pc:docMk xmlns:pc="http://schemas.microsoft.com/office/powerpoint/2013/main/command"/>
+      <pc:sldMk xmlns:pc="http://schemas.microsoft.com/office/powerpoint/2013/main/command" cId="405744010" sldId="259"/>
+      <ac:spMk id="3" creationId="{465EDD4A-2141-EB06-878A-FCFFEE8DEFB7}"/>
+      <ac:txMk cp="0" len="41">
+        <ac:context len="324" hash="2775460875"/>
+      </ac:txMk>
+    </ac:txMkLst>
+    <p188:pos x="5327210" y="263050"/>
+    <p188:txBody>
+      <a:bodyPr/>
+      <a:lstStyle/>
+      <a:p>
+        <a:r>
+          <a:rPr lang="en-US"/>
+          <a:t>"We performed benchmarks for calculating the latency and cost of the service"</a:t>
+        </a:r>
+      </a:p>
+    </p188:txBody>
+  </p188:cm>
+  <p188:cm id="{26050D65-6E69-49F8-9BB6-2CD380C9592F}" authorId="{55030633-4757-97B9-B860-0B6DF96F043A}" created="2024-01-18T12:06:35.930">
+    <ac:deMkLst xmlns:ac="http://schemas.microsoft.com/office/drawing/2013/main/command">
+      <pc:docMk xmlns:pc="http://schemas.microsoft.com/office/powerpoint/2013/main/command"/>
+      <pc:sldMk xmlns:pc="http://schemas.microsoft.com/office/powerpoint/2013/main/command" cId="405744010" sldId="259"/>
+      <ac:picMk id="4" creationId="{D06CEAD5-33D4-EAE9-45D1-B42BFCF34D17}"/>
+    </ac:deMkLst>
+    <p188:replyLst>
+      <p188:reply id="{822FF72C-EF85-4033-A127-B7903987BD66}" authorId="{55030633-4757-97B9-B860-0B6DF96F043A}" created="2024-01-18T12:10:14.010">
+        <p188:txBody>
+          <a:bodyPr/>
+          <a:lstStyle/>
+          <a:p>
+            <a:r>
+              <a:rPr lang="en-US"/>
+              <a:t>"Scenario" is better than "Configuration." 
+More explanatory scenario names:
+"Extracting dish name from sentence (English)"
+"Detecting Language"
+</a:t>
+            </a:r>
+          </a:p>
+        </p188:txBody>
+      </p188:reply>
+    </p188:replyLst>
+    <p188:txBody>
+      <a:bodyPr/>
+      <a:lstStyle/>
+      <a:p>
+        <a:r>
+          <a:rPr lang="en-US"/>
+          <a:t>The numbers are incorrect. I've fixed the tests.
+Make the title smaller and rows bigger. You may use multi line in the title. Remove unnecessary emptiness in the table</a:t>
+        </a:r>
+      </a:p>
+    </p188:txBody>
+  </p188:cm>
+</p188:cmLst>
+</file>
+
+<file path=ppt/comments/modernComment_104_7F485EC.xml><?xml version="1.0" encoding="utf-8"?>
+<p188:cmLst xmlns:a="http://schemas.openxmlformats.org/drawingml/2006/main" xmlns:r="http://schemas.openxmlformats.org/officeDocument/2006/relationships" xmlns:p188="http://schemas.microsoft.com/office/powerpoint/2018/8/main">
+  <p188:cm id="{2040CD66-8A21-42AC-A776-14B795D370C4}" authorId="{55030633-4757-97B9-B860-0B6DF96F043A}" created="2024-01-18T12:12:36.410">
+    <ac:txMkLst xmlns:ac="http://schemas.microsoft.com/office/drawing/2013/main/command">
+      <pc:docMk xmlns:pc="http://schemas.microsoft.com/office/powerpoint/2013/main/command"/>
+      <pc:sldMk xmlns:pc="http://schemas.microsoft.com/office/powerpoint/2013/main/command" cId="133465580" sldId="260"/>
+      <ac:spMk id="3" creationId="{412B85AA-98A0-2E25-BC2E-CC6805E725D4}"/>
+      <ac:txMk cp="112" len="55">
+        <ac:context len="809" hash="3556250053"/>
+      </ac:txMk>
+    </ac:txMkLst>
+    <p188:pos x="5852311" y="1204610"/>
+    <p188:txBody>
+      <a:bodyPr/>
+      <a:lstStyle/>
+      <a:p>
+        <a:r>
+          <a:rPr lang="en-US"/>
+          <a:t>After that? Write the details for the non-free part. And the costs in our scenario</a:t>
+        </a:r>
+      </a:p>
+    </p188:txBody>
+  </p188:cm>
+  <p188:cm id="{16F07BAE-59DB-4220-BBCA-9AD7C8CFD4ED}" authorId="{55030633-4757-97B9-B860-0B6DF96F043A}" created="2024-01-18T12:13:22.132">
+    <ac:txMkLst xmlns:ac="http://schemas.microsoft.com/office/drawing/2013/main/command">
+      <pc:docMk xmlns:pc="http://schemas.microsoft.com/office/powerpoint/2013/main/command"/>
+      <pc:sldMk xmlns:pc="http://schemas.microsoft.com/office/powerpoint/2013/main/command" cId="133465580" sldId="260"/>
+      <ac:spMk id="3" creationId="{412B85AA-98A0-2E25-BC2E-CC6805E725D4}"/>
+      <ac:txMk cp="410" len="16">
+        <ac:context len="809" hash="3556250053"/>
+      </ac:txMk>
+    </ac:txMkLst>
+    <p188:pos x="6087701" y="2272919"/>
+    <p188:txBody>
+      <a:bodyPr/>
+      <a:lstStyle/>
+      <a:p>
+        <a:r>
+          <a:rPr lang="en-US"/>
+          <a:t>First and Double?
+THEY won't see our code. Give the name of the step instead</a:t>
+        </a:r>
+      </a:p>
+    </p188:txBody>
+  </p188:cm>
+  <p188:cm id="{6CA421B6-0F00-4794-99C0-853DA738D8B7}" authorId="{55030633-4757-97B9-B860-0B6DF96F043A}" created="2024-01-18T12:16:36.610">
+    <ac:txMkLst xmlns:ac="http://schemas.microsoft.com/office/drawing/2013/main/command">
+      <pc:docMk xmlns:pc="http://schemas.microsoft.com/office/powerpoint/2013/main/command"/>
+      <pc:sldMk xmlns:pc="http://schemas.microsoft.com/office/powerpoint/2013/main/command" cId="133465580" sldId="260"/>
+      <ac:spMk id="3" creationId="{412B85AA-98A0-2E25-BC2E-CC6805E725D4}"/>
+      <ac:txMk cp="513" len="294">
+        <ac:context len="809" hash="3556250053"/>
+      </ac:txMk>
+    </ac:txMkLst>
+    <p188:pos x="9518964" y="3178265"/>
+    <p188:txBody>
+      <a:bodyPr/>
+      <a:lstStyle/>
+      <a:p>
+        <a:r>
+          <a:rPr lang="en-US"/>
+          <a:t>Fix numbers and give the name of the steps.
+i.e. Not "First Checks", but "extracting and cleaning the dish name and number of servings"
+Not "double check", but "Check validity of the input using the second agent"</a:t>
+        </a:r>
+      </a:p>
+    </p188:txBody>
+  </p188:cm>
+</p188:cmLst>
 </file>
 
 <file path=ppt/notesMasters/notesMaster1.xml><?xml version="1.0" encoding="utf-8"?>
@@ -210,7 +501,7 @@
           </a:lstStyle>
           <a:p>
             <a:fld id="{CC9BE89C-4441-40DB-BEC9-64D2C6065069}" type="datetimeFigureOut">
-              <a:t>1/17/2024</a:t>
+              <a:t>1/18/2024</a:t>
             </a:fld>
             <a:endParaRPr lang="en-GB"/>
           </a:p>
@@ -726,7 +1017,7 @@
                 <a:ea typeface="Calibri"/>
                 <a:cs typeface="Calibri"/>
               </a:rPr>
-              <a:t>The first step of the application is giving inputs.</a:t>
+              <a:t>During development these technologies are used:</a:t>
             </a:r>
           </a:p>
           <a:p>
@@ -735,7 +1026,25 @@
                 <a:ea typeface="Calibri"/>
                 <a:cs typeface="Calibri"/>
               </a:rPr>
-              <a:t>Inputs can be given as only dish name and servings count ("hamburger", "margarita pizza", "seven", "8") or as sentence ("How can I do margarita pizza?", "We are seven men.").</a:t>
+              <a:t> + Python</a:t>
+            </a:r>
+          </a:p>
+          <a:p>
+            <a:r>
+              <a:rPr lang="en-US" dirty="0">
+                <a:ea typeface="Calibri"/>
+                <a:cs typeface="Calibri"/>
+              </a:rPr>
+              <a:t> + Azure OpenAI</a:t>
+            </a:r>
+          </a:p>
+          <a:p>
+            <a:r>
+              <a:rPr lang="en-US" dirty="0">
+                <a:ea typeface="Calibri"/>
+                <a:cs typeface="Calibri"/>
+              </a:rPr>
+              <a:t> + Azure Speech to Text Service</a:t>
             </a:r>
           </a:p>
           <a:p>
@@ -745,18 +1054,48 @@
             </a:endParaRPr>
           </a:p>
           <a:p>
-            <a:endParaRPr lang="en-US" dirty="0"/>
-          </a:p>
-          <a:p>
-            <a:r>
-              <a:rPr lang="en-US" dirty="0"/>
-              <a:t>Prompt input can be given by using terminal. For audio input, application will find default audio option in computer (Which microphone), and start to listen user sentences. </a:t>
-            </a:r>
-          </a:p>
-          <a:p>
-            <a:r>
-              <a:rPr lang="en-US" dirty="0"/>
-              <a:t>After a few seconds of silence, it will be ready to convert audio input to the text.</a:t>
+            <a:r>
+              <a:rPr lang="en-US" dirty="0">
+                <a:ea typeface="Calibri"/>
+                <a:cs typeface="Calibri"/>
+              </a:rPr>
+              <a:t>Inputs can be given as a sentence (Not just a word). Moreover, sentence can be both question and statement etc. </a:t>
+            </a:r>
+          </a:p>
+          <a:p>
+            <a:r>
+              <a:rPr lang="en-US" dirty="0">
+                <a:ea typeface="Calibri"/>
+                <a:cs typeface="Calibri"/>
+              </a:rPr>
+              <a:t>For example, both "How can I do margarita pizza?" and "Today, I would like to eat margarita pizza." Are valid inputs.</a:t>
+            </a:r>
+          </a:p>
+          <a:p>
+            <a:r>
+              <a:rPr lang="en-US" dirty="0">
+                <a:ea typeface="Calibri"/>
+                <a:cs typeface="Calibri"/>
+              </a:rPr>
+              <a:t>Only needs 2 inputs:</a:t>
+            </a:r>
+          </a:p>
+          <a:p>
+            <a:r>
+              <a:rPr lang="en-US" dirty="0">
+                <a:ea typeface="Calibri"/>
+                <a:cs typeface="Calibri"/>
+              </a:rPr>
+              <a:t> + Dish Name</a:t>
+            </a:r>
+          </a:p>
+          <a:p>
+            <a:r>
+              <a:rPr lang="en-US" dirty="0">
+                <a:ea typeface="Calibri"/>
+                <a:cs typeface="Calibri"/>
+              </a:rPr>
+              <a:t> + Servings Count</a:t>
             </a:r>
           </a:p>
           <a:p>
@@ -771,7 +1110,7 @@
                 <a:ea typeface="Calibri"/>
                 <a:cs typeface="Calibri"/>
               </a:rPr>
-              <a:t>After getting inputs, system will determine the language of them. There are two possible options for that step:</a:t>
+              <a:t>Returns 2 outputs:</a:t>
             </a:r>
           </a:p>
           <a:p>
@@ -780,7 +1119,7 @@
                 <a:ea typeface="Calibri"/>
                 <a:cs typeface="Calibri"/>
               </a:rPr>
-              <a:t>  + Asking Azure OpenAI. That case is an option when user use prompt (Text) input</a:t>
+              <a:t> + Required Items</a:t>
             </a:r>
           </a:p>
           <a:p>
@@ -789,23 +1128,8 @@
                 <a:ea typeface="Calibri"/>
                 <a:cs typeface="Calibri"/>
               </a:rPr>
-              <a:t>  + Speech-to-Text Service's </a:t>
-            </a:r>
-            <a:r>
-              <a:rPr lang="en-US" dirty="0"/>
-              <a:t>Automatic Language Detection feature. That case is an option when user use audio (Microphone).</a:t>
-            </a:r>
-            <a:endParaRPr lang="en-US" dirty="0">
-              <a:cs typeface="Calibri"/>
-            </a:endParaRPr>
-          </a:p>
-          <a:p>
-            <a:endParaRPr lang="en-US" dirty="0">
-              <a:ea typeface="Calibri"/>
-              <a:cs typeface="Calibri"/>
-            </a:endParaRPr>
-          </a:p>
-          <a:p>
+              <a:t>    + Quantities</a:t>
+            </a:r>
             <a:endParaRPr lang="en-US" dirty="0"/>
           </a:p>
         </p:txBody>
@@ -835,7 +1159,7 @@
     </p:spTree>
     <p:extLst>
       <p:ext uri="{BB962C8B-B14F-4D97-AF65-F5344CB8AC3E}">
-        <p14:creationId xmlns:p14="http://schemas.microsoft.com/office/powerpoint/2010/main" val="731730649"/>
+        <p14:creationId xmlns:p14="http://schemas.microsoft.com/office/powerpoint/2010/main" val="2228675560"/>
       </p:ext>
     </p:extLst>
   </p:cSld>
@@ -891,41 +1215,77 @@
           <a:p>
             <a:r>
               <a:rPr lang="en-US" dirty="0">
-                <a:cs typeface="Calibri"/>
-              </a:rPr>
-              <a:t>After getting user inputs (For Dish Name and Servings Count), system will clean them.</a:t>
+                <a:ea typeface="Calibri"/>
+                <a:cs typeface="Calibri"/>
+              </a:rPr>
+              <a:t>The first step of the application is giving inputs.</a:t>
             </a:r>
           </a:p>
           <a:p>
             <a:r>
               <a:rPr lang="en-US" dirty="0">
-                <a:cs typeface="Calibri"/>
-              </a:rPr>
-              <a:t>That means if the user gives sentence as an input such as "I want to make margarita pizza today.", application will clean the sentence and gets only "</a:t>
-            </a:r>
+                <a:ea typeface="Calibri"/>
+                <a:cs typeface="Calibri"/>
+              </a:rPr>
+              <a:t>Inputs can be given as only dish name and servings count ("hamburger", "margarita pizza", "seven", "8") or as sentence ("How can I do margarita pizza?", "We are seven men.").</a:t>
+            </a:r>
+          </a:p>
+          <a:p>
+            <a:endParaRPr lang="en-US" dirty="0">
+              <a:ea typeface="Calibri"/>
+              <a:cs typeface="Calibri"/>
+            </a:endParaRPr>
+          </a:p>
+          <a:p>
+            <a:endParaRPr lang="en-US" dirty="0"/>
+          </a:p>
+          <a:p>
             <a:r>
               <a:rPr lang="en-US" dirty="0"/>
-              <a:t>margarita pizza</a:t>
-            </a:r>
+              <a:t>Prompt input can be given by using terminal. For audio input, application will find default audio option in computer (Which microphone), and start to listen user sentences. </a:t>
+            </a:r>
+          </a:p>
+          <a:p>
+            <a:r>
+              <a:rPr lang="en-US" dirty="0"/>
+              <a:t>After a few seconds of silence, it will be ready to convert audio input to the text.</a:t>
+            </a:r>
+          </a:p>
+          <a:p>
+            <a:endParaRPr lang="en-US" dirty="0">
+              <a:ea typeface="Calibri"/>
+              <a:cs typeface="Calibri"/>
+            </a:endParaRPr>
+          </a:p>
+          <a:p>
             <a:r>
               <a:rPr lang="en-US" dirty="0">
-                <a:cs typeface="Calibri"/>
-              </a:rPr>
-              <a:t>".</a:t>
-            </a:r>
-          </a:p>
-          <a:p>
+                <a:ea typeface="Calibri"/>
+                <a:cs typeface="Calibri"/>
+              </a:rPr>
+              <a:t>After getting inputs, system will determine the language of them. There are two possible options for that step:</a:t>
+            </a:r>
+          </a:p>
+          <a:p>
+            <a:r>
+              <a:rPr lang="en-US" dirty="0">
+                <a:ea typeface="Calibri"/>
+                <a:cs typeface="Calibri"/>
+              </a:rPr>
+              <a:t>  + Asking Azure OpenAI. That case is an option when user use prompt (Text) input</a:t>
+            </a:r>
+          </a:p>
+          <a:p>
+            <a:r>
+              <a:rPr lang="en-US" dirty="0">
+                <a:ea typeface="Calibri"/>
+                <a:cs typeface="Calibri"/>
+              </a:rPr>
+              <a:t>  + Speech-to-Text Service's </a:t>
+            </a:r>
             <a:r>
               <a:rPr lang="en-US" dirty="0"/>
-              <a:t>Likewise, same method is also applied for servings count. From inputs such as "We are seven people.", </a:t>
-            </a:r>
-            <a:r>
-              <a:rPr lang="en-US" err="1"/>
-              <a:t>applciation</a:t>
-            </a:r>
-            <a:r>
-              <a:rPr lang="en-US" dirty="0"/>
-              <a:t> gets "7" as integer (Converts all string number/counts to integer).</a:t>
+              <a:t>Automatic Language Detection feature. That case is an option when user use audio (Microphone).</a:t>
             </a:r>
             <a:endParaRPr lang="en-US" dirty="0">
               <a:cs typeface="Calibri"/>
@@ -933,47 +1293,12 @@
           </a:p>
           <a:p>
             <a:endParaRPr lang="en-US" dirty="0">
+              <a:ea typeface="Calibri"/>
               <a:cs typeface="Calibri"/>
             </a:endParaRPr>
           </a:p>
           <a:p>
-            <a:r>
-              <a:rPr lang="en-US" dirty="0">
-                <a:cs typeface="Calibri"/>
-              </a:rPr>
-              <a:t>For this scraping part, we are using Azure OpenAI Service. Giving full sentence (User input) and language of the input to the Azure OpenAI, we get only the valid Dish Name or Servings Count. </a:t>
-            </a:r>
-          </a:p>
-          <a:p>
-            <a:endParaRPr lang="en-US" dirty="0">
-              <a:cs typeface="Calibri"/>
-            </a:endParaRPr>
-          </a:p>
-          <a:p>
-            <a:r>
-              <a:rPr lang="en-US">
-                <a:cs typeface="Calibri"/>
-              </a:rPr>
-              <a:t>After getting scraped inputs (Dish Name/Servings Count), we use second check mechanism. It will ask Azure OpenAI, if given input is valid for that type (Dish Name / Integer). </a:t>
-            </a:r>
-            <a:endParaRPr lang="en-US" dirty="0">
-              <a:cs typeface="Calibri"/>
-            </a:endParaRPr>
-          </a:p>
-          <a:p>
-            <a:r>
-              <a:rPr lang="en-US" dirty="0">
-                <a:cs typeface="Calibri"/>
-              </a:rPr>
-              <a:t>For example, if user gives such sentence as input "I would like to cook car today", first check (Clean input method) gives "car" as Dish Name </a:t>
-            </a:r>
-            <a:r>
-              <a:rPr lang="en-US" dirty="0"/>
-              <a:t>mistakenly. So, we implemented second check mechanism. </a:t>
-            </a:r>
-            <a:endParaRPr lang="en-US" dirty="0">
-              <a:cs typeface="Calibri"/>
-            </a:endParaRPr>
+            <a:endParaRPr lang="en-US" dirty="0"/>
           </a:p>
         </p:txBody>
       </p:sp>
@@ -993,7 +1318,6 @@
           <a:lstStyle/>
           <a:p>
             <a:fld id="{7001E445-E53F-454B-94FE-CBA9D21A2660}" type="slidenum">
-              <a:rPr lang="en-GB"/>
               <a:t>3</a:t>
             </a:fld>
             <a:endParaRPr lang="en-GB"/>
@@ -1003,7 +1327,7 @@
     </p:spTree>
     <p:extLst>
       <p:ext uri="{BB962C8B-B14F-4D97-AF65-F5344CB8AC3E}">
-        <p14:creationId xmlns:p14="http://schemas.microsoft.com/office/powerpoint/2010/main" val="2154201987"/>
+        <p14:creationId xmlns:p14="http://schemas.microsoft.com/office/powerpoint/2010/main" val="731730649"/>
       </p:ext>
     </p:extLst>
   </p:cSld>
@@ -1061,7 +1385,7 @@
               <a:rPr lang="en-US" dirty="0">
                 <a:cs typeface="Calibri"/>
               </a:rPr>
-              <a:t>We tested our application with various unit tests.</a:t>
+              <a:t>After getting user inputs (For Dish Name and Servings Count), system will clean them.</a:t>
             </a:r>
           </a:p>
           <a:p>
@@ -1069,61 +1393,37 @@
               <a:rPr lang="en-US" dirty="0">
                 <a:cs typeface="Calibri"/>
               </a:rPr>
-              <a:t>We tested our clean Dish Name and clean Servings Counts methods (They use Azure OpenAI service) with 3 languages (</a:t>
-            </a:r>
-            <a:r>
-              <a:rPr lang="en-GB" dirty="0"/>
-              <a:t>English, German and Turkish</a:t>
+              <a:t>That means if the user gives sentence as an input such as "I want to make margarita pizza today.", application will clean the sentence and gets only "</a:t>
+            </a:r>
+            <a:r>
+              <a:rPr lang="en-US" dirty="0"/>
+              <a:t>margarita pizza</a:t>
             </a:r>
             <a:r>
               <a:rPr lang="en-US" dirty="0">
                 <a:cs typeface="Calibri"/>
               </a:rPr>
-              <a:t>) and with various input sentences.</a:t>
-            </a:r>
-          </a:p>
-          <a:p>
-            <a:r>
-              <a:rPr lang="en-US" dirty="0">
-                <a:cs typeface="Calibri"/>
-              </a:rPr>
-              <a:t>We also implement unit tests for Type Check and Language Detection of application (If given input is valid for that type / Determine the </a:t>
-            </a:r>
-            <a:r>
-              <a:rPr lang="en-US" dirty="0" err="1">
-                <a:cs typeface="Calibri"/>
-              </a:rPr>
-              <a:t>langiage</a:t>
-            </a:r>
-            <a:r>
-              <a:rPr lang="en-US" dirty="0">
-                <a:cs typeface="Calibri"/>
-              </a:rPr>
-              <a:t> of user input).</a:t>
-            </a:r>
-          </a:p>
-          <a:p>
+              <a:t>".</a:t>
+            </a:r>
+          </a:p>
+          <a:p>
+            <a:r>
+              <a:rPr lang="en-US" dirty="0"/>
+              <a:t>Likewise, same method is also applied for servings count. From inputs such as "We are seven people.", </a:t>
+            </a:r>
+            <a:r>
+              <a:rPr lang="en-US" err="1"/>
+              <a:t>applciation</a:t>
+            </a:r>
+            <a:r>
+              <a:rPr lang="en-US" dirty="0"/>
+              <a:t> gets "7" as integer (Converts all string number/counts to integer).</a:t>
+            </a:r>
             <a:endParaRPr lang="en-US" dirty="0">
               <a:cs typeface="Calibri"/>
             </a:endParaRPr>
           </a:p>
           <a:p>
-            <a:r>
-              <a:rPr lang="en-US" dirty="0">
-                <a:cs typeface="Calibri"/>
-              </a:rPr>
-              <a:t>These are the results of unit tests. </a:t>
-            </a:r>
-          </a:p>
-          <a:p>
-            <a:r>
-              <a:rPr lang="en-US" dirty="0">
-                <a:cs typeface="Calibri"/>
-              </a:rPr>
-              <a:t>We measured Duration, Cost and Average Token for per input.</a:t>
-            </a:r>
-          </a:p>
-          <a:p>
             <a:endParaRPr lang="en-US" dirty="0">
               <a:cs typeface="Calibri"/>
             </a:endParaRPr>
@@ -1133,8 +1433,39 @@
               <a:rPr lang="en-US" dirty="0">
                 <a:cs typeface="Calibri"/>
               </a:rPr>
-              <a:t>[Evaluation of results in next page]</a:t>
-            </a:r>
+              <a:t>For this scraping part, we are using Azure OpenAI Service. Giving full sentence (User input) and language of the input to the Azure OpenAI, we get only the valid Dish Name or Servings Count. </a:t>
+            </a:r>
+          </a:p>
+          <a:p>
+            <a:endParaRPr lang="en-US" dirty="0">
+              <a:cs typeface="Calibri"/>
+            </a:endParaRPr>
+          </a:p>
+          <a:p>
+            <a:r>
+              <a:rPr lang="en-US">
+                <a:cs typeface="Calibri"/>
+              </a:rPr>
+              <a:t>After getting scraped inputs (Dish Name/Servings Count), we use second check mechanism. It will ask Azure OpenAI, if given input is valid for that type (Dish Name / Integer). </a:t>
+            </a:r>
+            <a:endParaRPr lang="en-US" dirty="0">
+              <a:cs typeface="Calibri"/>
+            </a:endParaRPr>
+          </a:p>
+          <a:p>
+            <a:r>
+              <a:rPr lang="en-US" dirty="0">
+                <a:cs typeface="Calibri"/>
+              </a:rPr>
+              <a:t>For example, if user gives such sentence as input "I would like to cook car today", first check (Clean input method) gives "car" as Dish Name </a:t>
+            </a:r>
+            <a:r>
+              <a:rPr lang="en-US" dirty="0"/>
+              <a:t>mistakenly. So, we implemented second check mechanism. </a:t>
+            </a:r>
+            <a:endParaRPr lang="en-US" dirty="0">
+              <a:cs typeface="Calibri"/>
+            </a:endParaRPr>
           </a:p>
         </p:txBody>
       </p:sp>
@@ -1164,7 +1495,7 @@
     </p:spTree>
     <p:extLst>
       <p:ext uri="{BB962C8B-B14F-4D97-AF65-F5344CB8AC3E}">
-        <p14:creationId xmlns:p14="http://schemas.microsoft.com/office/powerpoint/2010/main" val="2705300331"/>
+        <p14:creationId xmlns:p14="http://schemas.microsoft.com/office/powerpoint/2010/main" val="2154201987"/>
       </p:ext>
     </p:extLst>
   </p:cSld>
@@ -1222,6 +1553,167 @@
               <a:rPr lang="en-US" dirty="0">
                 <a:cs typeface="Calibri"/>
               </a:rPr>
+              <a:t>We tested our application with various unit tests.</a:t>
+            </a:r>
+          </a:p>
+          <a:p>
+            <a:r>
+              <a:rPr lang="en-US" dirty="0">
+                <a:cs typeface="Calibri"/>
+              </a:rPr>
+              <a:t>We tested our clean Dish Name and clean Servings Counts methods (They use Azure OpenAI service) with 3 languages (</a:t>
+            </a:r>
+            <a:r>
+              <a:rPr lang="en-GB" dirty="0"/>
+              <a:t>English, German and Turkish</a:t>
+            </a:r>
+            <a:r>
+              <a:rPr lang="en-US" dirty="0">
+                <a:cs typeface="Calibri"/>
+              </a:rPr>
+              <a:t>) and with various input sentences.</a:t>
+            </a:r>
+          </a:p>
+          <a:p>
+            <a:r>
+              <a:rPr lang="en-US" dirty="0">
+                <a:cs typeface="Calibri"/>
+              </a:rPr>
+              <a:t>We also implement unit tests for Type Check and Language Detection of application (If given input is valid for that type / Determine the </a:t>
+            </a:r>
+            <a:r>
+              <a:rPr lang="en-US" dirty="0" err="1">
+                <a:cs typeface="Calibri"/>
+              </a:rPr>
+              <a:t>langiage</a:t>
+            </a:r>
+            <a:r>
+              <a:rPr lang="en-US" dirty="0">
+                <a:cs typeface="Calibri"/>
+              </a:rPr>
+              <a:t> of user input).</a:t>
+            </a:r>
+          </a:p>
+          <a:p>
+            <a:endParaRPr lang="en-US" dirty="0">
+              <a:cs typeface="Calibri"/>
+            </a:endParaRPr>
+          </a:p>
+          <a:p>
+            <a:r>
+              <a:rPr lang="en-US" dirty="0">
+                <a:cs typeface="Calibri"/>
+              </a:rPr>
+              <a:t>These are the results of unit tests. </a:t>
+            </a:r>
+          </a:p>
+          <a:p>
+            <a:r>
+              <a:rPr lang="en-US" dirty="0">
+                <a:cs typeface="Calibri"/>
+              </a:rPr>
+              <a:t>We measured Duration, Cost and Average Token for per input.</a:t>
+            </a:r>
+          </a:p>
+          <a:p>
+            <a:endParaRPr lang="en-US" dirty="0">
+              <a:cs typeface="Calibri"/>
+            </a:endParaRPr>
+          </a:p>
+          <a:p>
+            <a:r>
+              <a:rPr lang="en-US" dirty="0">
+                <a:cs typeface="Calibri"/>
+              </a:rPr>
+              <a:t>[Evaluation of results in next page]</a:t>
+            </a:r>
+          </a:p>
+        </p:txBody>
+      </p:sp>
+      <p:sp>
+        <p:nvSpPr>
+          <p:cNvPr id="4" name="Slide Number Placeholder 3"/>
+          <p:cNvSpPr>
+            <a:spLocks noGrp="1"/>
+          </p:cNvSpPr>
+          <p:nvPr>
+            <p:ph type="sldNum" sz="quarter" idx="5"/>
+          </p:nvPr>
+        </p:nvSpPr>
+        <p:spPr/>
+        <p:txBody>
+          <a:bodyPr/>
+          <a:lstStyle/>
+          <a:p>
+            <a:fld id="{7001E445-E53F-454B-94FE-CBA9D21A2660}" type="slidenum">
+              <a:rPr lang="en-GB"/>
+              <a:t>5</a:t>
+            </a:fld>
+            <a:endParaRPr lang="en-GB"/>
+          </a:p>
+        </p:txBody>
+      </p:sp>
+    </p:spTree>
+    <p:extLst>
+      <p:ext uri="{BB962C8B-B14F-4D97-AF65-F5344CB8AC3E}">
+        <p14:creationId xmlns:p14="http://schemas.microsoft.com/office/powerpoint/2010/main" val="2705300331"/>
+      </p:ext>
+    </p:extLst>
+  </p:cSld>
+  <p:clrMapOvr>
+    <a:masterClrMapping/>
+  </p:clrMapOvr>
+</p:notes>
+</file>
+
+<file path=ppt/notesSlides/notesSlide6.xml><?xml version="1.0" encoding="utf-8"?>
+<p:notes xmlns:a="http://schemas.openxmlformats.org/drawingml/2006/main" xmlns:r="http://schemas.openxmlformats.org/officeDocument/2006/relationships" xmlns:p="http://schemas.openxmlformats.org/presentationml/2006/main">
+  <p:cSld>
+    <p:spTree>
+      <p:nvGrpSpPr>
+        <p:cNvPr id="1" name=""/>
+        <p:cNvGrpSpPr/>
+        <p:nvPr/>
+      </p:nvGrpSpPr>
+      <p:grpSpPr>
+        <a:xfrm>
+          <a:off x="0" y="0"/>
+          <a:ext cx="0" cy="0"/>
+          <a:chOff x="0" y="0"/>
+          <a:chExt cx="0" cy="0"/>
+        </a:xfrm>
+      </p:grpSpPr>
+      <p:sp>
+        <p:nvSpPr>
+          <p:cNvPr id="2" name="Slide Image Placeholder 1"/>
+          <p:cNvSpPr>
+            <a:spLocks noGrp="1" noRot="1" noChangeAspect="1"/>
+          </p:cNvSpPr>
+          <p:nvPr>
+            <p:ph type="sldImg"/>
+          </p:nvPr>
+        </p:nvSpPr>
+        <p:spPr/>
+      </p:sp>
+      <p:sp>
+        <p:nvSpPr>
+          <p:cNvPr id="3" name="Notes Placeholder 2"/>
+          <p:cNvSpPr>
+            <a:spLocks noGrp="1"/>
+          </p:cNvSpPr>
+          <p:nvPr>
+            <p:ph type="body" idx="1"/>
+          </p:nvPr>
+        </p:nvSpPr>
+        <p:spPr/>
+        <p:txBody>
+          <a:bodyPr/>
+          <a:lstStyle/>
+          <a:p>
+            <a:r>
+              <a:rPr lang="en-US" dirty="0">
+                <a:cs typeface="Calibri"/>
+              </a:rPr>
               <a:t>As the main cost of the application is Azure OpenAI usage, we focused on that cost. </a:t>
             </a:r>
           </a:p>
@@ -1385,7 +1877,7 @@
           <a:p>
             <a:fld id="{7001E445-E53F-454B-94FE-CBA9D21A2660}" type="slidenum">
               <a:rPr lang="en-GB"/>
-              <a:t>5</a:t>
+              <a:t>6</a:t>
             </a:fld>
             <a:endParaRPr lang="en-GB"/>
           </a:p>
@@ -1533,7 +2025,7 @@
           <a:p>
             <a:fld id="{846CE7D5-CF57-46EF-B807-FDD0502418D4}" type="datetimeFigureOut">
               <a:rPr lang="en-GB" smtClean="0"/>
-              <a:t>17/01/2024</a:t>
+              <a:t>18/01/2024</a:t>
             </a:fld>
             <a:endParaRPr lang="en-GB"/>
           </a:p>
@@ -1701,7 +2193,7 @@
           <a:p>
             <a:fld id="{846CE7D5-CF57-46EF-B807-FDD0502418D4}" type="datetimeFigureOut">
               <a:rPr lang="en-GB" smtClean="0"/>
-              <a:t>17/01/2024</a:t>
+              <a:t>18/01/2024</a:t>
             </a:fld>
             <a:endParaRPr lang="en-GB"/>
           </a:p>
@@ -1879,7 +2371,7 @@
           <a:p>
             <a:fld id="{846CE7D5-CF57-46EF-B807-FDD0502418D4}" type="datetimeFigureOut">
               <a:rPr lang="en-GB" smtClean="0"/>
-              <a:t>17/01/2024</a:t>
+              <a:t>18/01/2024</a:t>
             </a:fld>
             <a:endParaRPr lang="en-GB"/>
           </a:p>
@@ -1967,7 +2459,12 @@
             <p:ph type="title"/>
           </p:nvPr>
         </p:nvSpPr>
-        <p:spPr/>
+        <p:spPr>
+          <a:xfrm>
+            <a:off x="838200" y="365126"/>
+            <a:ext cx="10515600" cy="786342"/>
+          </a:xfrm>
+        </p:spPr>
         <p:txBody>
           <a:bodyPr/>
           <a:lstStyle/>
@@ -1989,7 +2486,12 @@
             <p:ph idx="1"/>
           </p:nvPr>
         </p:nvSpPr>
-        <p:spPr/>
+        <p:spPr>
+          <a:xfrm>
+            <a:off x="838200" y="1303200"/>
+            <a:ext cx="10515600" cy="4896000"/>
+          </a:xfrm>
+        </p:spPr>
         <p:txBody>
           <a:bodyPr/>
           <a:lstStyle/>
@@ -2047,7 +2549,7 @@
           <a:p>
             <a:fld id="{846CE7D5-CF57-46EF-B807-FDD0502418D4}" type="datetimeFigureOut">
               <a:rPr lang="en-GB" smtClean="0"/>
-              <a:t>17/01/2024</a:t>
+              <a:t>18/01/2024</a:t>
             </a:fld>
             <a:endParaRPr lang="en-GB"/>
           </a:p>
@@ -2292,7 +2794,7 @@
           <a:p>
             <a:fld id="{846CE7D5-CF57-46EF-B807-FDD0502418D4}" type="datetimeFigureOut">
               <a:rPr lang="en-GB" smtClean="0"/>
-              <a:t>17/01/2024</a:t>
+              <a:t>18/01/2024</a:t>
             </a:fld>
             <a:endParaRPr lang="en-GB"/>
           </a:p>
@@ -2521,7 +3023,7 @@
           <a:p>
             <a:fld id="{846CE7D5-CF57-46EF-B807-FDD0502418D4}" type="datetimeFigureOut">
               <a:rPr lang="en-GB" smtClean="0"/>
-              <a:t>17/01/2024</a:t>
+              <a:t>18/01/2024</a:t>
             </a:fld>
             <a:endParaRPr lang="en-GB"/>
           </a:p>
@@ -2885,7 +3387,7 @@
           <a:p>
             <a:fld id="{846CE7D5-CF57-46EF-B807-FDD0502418D4}" type="datetimeFigureOut">
               <a:rPr lang="en-GB" smtClean="0"/>
-              <a:t>17/01/2024</a:t>
+              <a:t>18/01/2024</a:t>
             </a:fld>
             <a:endParaRPr lang="en-GB"/>
           </a:p>
@@ -3002,7 +3504,7 @@
           <a:p>
             <a:fld id="{846CE7D5-CF57-46EF-B807-FDD0502418D4}" type="datetimeFigureOut">
               <a:rPr lang="en-GB" smtClean="0"/>
-              <a:t>17/01/2024</a:t>
+              <a:t>18/01/2024</a:t>
             </a:fld>
             <a:endParaRPr lang="en-GB"/>
           </a:p>
@@ -3097,7 +3599,7 @@
           <a:p>
             <a:fld id="{846CE7D5-CF57-46EF-B807-FDD0502418D4}" type="datetimeFigureOut">
               <a:rPr lang="en-GB" smtClean="0"/>
-              <a:t>17/01/2024</a:t>
+              <a:t>18/01/2024</a:t>
             </a:fld>
             <a:endParaRPr lang="en-GB"/>
           </a:p>
@@ -3372,7 +3874,7 @@
           <a:p>
             <a:fld id="{846CE7D5-CF57-46EF-B807-FDD0502418D4}" type="datetimeFigureOut">
               <a:rPr lang="en-GB" smtClean="0"/>
-              <a:t>17/01/2024</a:t>
+              <a:t>18/01/2024</a:t>
             </a:fld>
             <a:endParaRPr lang="en-GB"/>
           </a:p>
@@ -3627,7 +4129,7 @@
           <a:p>
             <a:fld id="{846CE7D5-CF57-46EF-B807-FDD0502418D4}" type="datetimeFigureOut">
               <a:rPr lang="en-GB" smtClean="0"/>
-              <a:t>17/01/2024</a:t>
+              <a:t>18/01/2024</a:t>
             </a:fld>
             <a:endParaRPr lang="en-GB"/>
           </a:p>
@@ -3722,8 +4224,8 @@
         </p:nvSpPr>
         <p:spPr>
           <a:xfrm>
-            <a:off x="838200" y="365125"/>
-            <a:ext cx="10515600" cy="1325563"/>
+            <a:off x="838200" y="365126"/>
+            <a:ext cx="10515600" cy="786342"/>
           </a:xfrm>
           <a:prstGeom prst="rect">
             <a:avLst/>
@@ -3754,8 +4256,8 @@
         </p:nvSpPr>
         <p:spPr>
           <a:xfrm>
-            <a:off x="838200" y="1825625"/>
-            <a:ext cx="10515600" cy="4351338"/>
+            <a:off x="838200" y="1303867"/>
+            <a:ext cx="10515600" cy="4896000"/>
           </a:xfrm>
           <a:prstGeom prst="rect">
             <a:avLst/>
@@ -3838,7 +4340,7 @@
           <a:p>
             <a:fld id="{846CE7D5-CF57-46EF-B807-FDD0502418D4}" type="datetimeFigureOut">
               <a:rPr lang="en-GB" smtClean="0"/>
-              <a:t>17/01/2024</a:t>
+              <a:t>18/01/2024</a:t>
             </a:fld>
             <a:endParaRPr lang="en-GB"/>
           </a:p>
@@ -4250,15 +4752,10 @@
             <a:spLocks noGrp="1"/>
           </p:cNvSpPr>
           <p:nvPr>
-            <p:ph type="ctrTitle"/>
-          </p:nvPr>
-        </p:nvSpPr>
-        <p:spPr>
-          <a:xfrm>
-            <a:off x="1524000" y="464272"/>
-            <a:ext cx="9063182" cy="1798782"/>
-          </a:xfrm>
-        </p:spPr>
+            <p:ph type="title"/>
+          </p:nvPr>
+        </p:nvSpPr>
+        <p:spPr/>
         <p:txBody>
           <a:bodyPr>
             <a:normAutofit/>
@@ -4266,21 +4763,16 @@
           <a:lstStyle/>
           <a:p>
             <a:r>
-              <a:rPr lang="en-GB">
+              <a:rPr lang="en-GB" dirty="0">
                 <a:ea typeface="+mj-lt"/>
                 <a:cs typeface="+mj-lt"/>
               </a:rPr>
               <a:t>Overview of the system</a:t>
             </a:r>
-            <a:endParaRPr lang="en-US">
+            <a:endParaRPr lang="en-US" dirty="0">
               <a:cs typeface="Calibri Light" panose="020F0302020204030204"/>
             </a:endParaRPr>
           </a:p>
-          <a:p>
-            <a:endParaRPr lang="en-GB">
-              <a:cs typeface="Calibri Light"/>
-            </a:endParaRPr>
-          </a:p>
         </p:txBody>
       </p:sp>
       <p:sp>
@@ -4290,15 +4782,10 @@
             <a:spLocks noGrp="1"/>
           </p:cNvSpPr>
           <p:nvPr>
-            <p:ph type="subTitle" idx="1"/>
-          </p:nvPr>
-        </p:nvSpPr>
-        <p:spPr>
-          <a:xfrm>
-            <a:off x="565728" y="1581584"/>
-            <a:ext cx="10102272" cy="4276579"/>
-          </a:xfrm>
-        </p:spPr>
+            <p:ph idx="1"/>
+          </p:nvPr>
+        </p:nvSpPr>
+        <p:spPr/>
         <p:txBody>
           <a:bodyPr vert="horz" lIns="91440" tIns="45720" rIns="91440" bIns="45720" rtlCol="0" anchor="t">
             <a:normAutofit/>
@@ -4309,154 +4796,38 @@
               <a:buChar char="•"/>
             </a:pPr>
             <a:r>
-              <a:rPr lang="en-GB">
+              <a:rPr lang="en-GB" dirty="0">
                 <a:latin typeface="Calibri"/>
                 <a:ea typeface="+mn-lt"/>
                 <a:cs typeface="Times New Roman"/>
               </a:rPr>
-              <a:t>Our project is an Artificial Intelligence application that takes the ‘dish name’ and ‘servings count’ information from user and returns the </a:t>
-            </a:r>
-            <a:r>
-              <a:rPr lang="en-GB" b="1">
+              <a:t>Our project is an Artificial Intelligence application that generates the ingredients list for the recipe using user input.</a:t>
+            </a:r>
+          </a:p>
+          <a:p>
+            <a:pPr marL="342900" indent="-342900" algn="l">
+              <a:buChar char="•"/>
+            </a:pPr>
+            <a:r>
+              <a:rPr lang="en-GB" dirty="0">
                 <a:latin typeface="Calibri"/>
                 <a:ea typeface="+mn-lt"/>
                 <a:cs typeface="Times New Roman"/>
               </a:rPr>
-              <a:t>required item</a:t>
-            </a:r>
-            <a:r>
-              <a:rPr lang="en-GB">
-                <a:latin typeface="Calibri"/>
-                <a:ea typeface="+mn-lt"/>
-                <a:cs typeface="Times New Roman"/>
-              </a:rPr>
-              <a:t> and </a:t>
-            </a:r>
-            <a:r>
-              <a:rPr lang="en-GB" b="1">
-                <a:latin typeface="Calibri"/>
-                <a:ea typeface="+mn-lt"/>
-                <a:cs typeface="Times New Roman"/>
-              </a:rPr>
-              <a:t>quantity</a:t>
-            </a:r>
-            <a:r>
-              <a:rPr lang="en-GB">
-                <a:latin typeface="Calibri"/>
-                <a:ea typeface="+mn-lt"/>
-                <a:cs typeface="Times New Roman"/>
-              </a:rPr>
-              <a:t> as an output.</a:t>
-            </a:r>
-            <a:endParaRPr lang="en-US">
-              <a:latin typeface="Calibri"/>
-              <a:cs typeface="Times New Roman"/>
-            </a:endParaRPr>
-          </a:p>
-          <a:p>
-            <a:pPr marL="285750" indent="-285750" algn="l">
-              <a:buFont typeface="Arial"/>
+              <a:t>It takes the dish name and number of servings information from the user and returns the name, quantity (with unit) of each item in the ingredients list.</a:t>
+            </a:r>
+          </a:p>
+          <a:p>
+            <a:pPr marL="342900" indent="-342900" algn="l">
               <a:buChar char="•"/>
             </a:pPr>
             <a:r>
-              <a:rPr lang="en-GB" b="1">
+              <a:rPr lang="en-US" dirty="0">
                 <a:latin typeface="Calibri"/>
-                <a:ea typeface="+mn-lt"/>
                 <a:cs typeface="Times New Roman"/>
               </a:rPr>
-              <a:t>The only thing the user needs to do</a:t>
-            </a:r>
-            <a:r>
-              <a:rPr lang="en-GB">
-                <a:latin typeface="Calibri"/>
-                <a:ea typeface="+mn-lt"/>
-                <a:cs typeface="Times New Roman"/>
-              </a:rPr>
-              <a:t> is to provide input that includes the desired meal and the number of people.</a:t>
-            </a:r>
-            <a:endParaRPr lang="en-GB">
-              <a:latin typeface="Calibri"/>
-              <a:cs typeface="Times New Roman"/>
-            </a:endParaRPr>
-          </a:p>
-          <a:p>
-            <a:pPr marL="285750" indent="-285750" algn="l">
-              <a:buFont typeface="Arial"/>
-              <a:buChar char="•"/>
-            </a:pPr>
-            <a:r>
-              <a:rPr lang="en-GB">
-                <a:latin typeface="Calibri"/>
-                <a:ea typeface="+mn-lt"/>
-                <a:cs typeface="Times New Roman"/>
-              </a:rPr>
-              <a:t>Afterwards, the application will present the required items and quantities to the user with the help of the database and Azure OpenAI.</a:t>
-            </a:r>
-            <a:endParaRPr lang="en-GB">
-              <a:latin typeface="Calibri"/>
-              <a:cs typeface="Times New Roman"/>
-            </a:endParaRPr>
-          </a:p>
-          <a:p>
-            <a:pPr marL="285750" indent="-285750" algn="l">
-              <a:buFont typeface="Arial"/>
-              <a:buChar char="•"/>
-            </a:pPr>
-            <a:r>
-              <a:rPr lang="en-GB">
-                <a:latin typeface="Calibri"/>
-                <a:ea typeface="+mn-lt"/>
-                <a:cs typeface="Times New Roman"/>
-              </a:rPr>
-              <a:t>Project is developed with Python and mainly two cloud services were used. These are:</a:t>
-            </a:r>
-            <a:endParaRPr lang="en-GB">
-              <a:latin typeface="Calibri"/>
-              <a:cs typeface="Times New Roman"/>
-            </a:endParaRPr>
-          </a:p>
-          <a:p>
-            <a:pPr marL="742950" lvl="1" indent="-285750" algn="l">
-              <a:buFont typeface="Arial"/>
-              <a:buChar char="•"/>
-            </a:pPr>
-            <a:r>
-              <a:rPr lang="en-GB">
-                <a:latin typeface="Calibri"/>
-                <a:ea typeface="+mn-lt"/>
-                <a:cs typeface="Times New Roman"/>
-              </a:rPr>
-              <a:t>Azure OpenAI</a:t>
-            </a:r>
-            <a:endParaRPr lang="en-GB">
-              <a:latin typeface="Calibri"/>
-              <a:cs typeface="Times New Roman"/>
-            </a:endParaRPr>
-          </a:p>
-          <a:p>
-            <a:pPr marL="742950" lvl="1" indent="-285750" algn="l">
-              <a:buFont typeface="Arial"/>
-              <a:buChar char="•"/>
-            </a:pPr>
-            <a:r>
-              <a:rPr lang="en-GB">
-                <a:latin typeface="Calibri"/>
-                <a:ea typeface="+mn-lt"/>
-                <a:cs typeface="Times New Roman"/>
-              </a:rPr>
-              <a:t>Azure Speech Service</a:t>
-            </a:r>
-            <a:endParaRPr lang="en-GB">
-              <a:latin typeface="Calibri"/>
-              <a:cs typeface="Times New Roman"/>
-            </a:endParaRPr>
-          </a:p>
-          <a:p>
-            <a:pPr algn="l"/>
-            <a:endParaRPr lang="en-GB">
-              <a:latin typeface="Calibri"/>
-              <a:cs typeface="Times New Roman"/>
-            </a:endParaRPr>
+              <a:t>It can also associate the ingredients with existing products in a given product database, adding product ID for each ingredient.</a:t>
+            </a:r>
           </a:p>
         </p:txBody>
       </p:sp>
@@ -4492,13 +4863,7 @@
       </p:grpSpPr>
       <p:sp>
         <p:nvSpPr>
-          <p:cNvPr id="2" name="Title 1">
-            <a:extLst>
-              <a:ext uri="{FF2B5EF4-FFF2-40B4-BE49-F238E27FC236}">
-                <a16:creationId xmlns:a16="http://schemas.microsoft.com/office/drawing/2014/main" id="{96356158-6643-F75E-5146-4B31E5643F11}"/>
-              </a:ext>
-            </a:extLst>
-          </p:cNvPr>
+          <p:cNvPr id="2" name="Title 1"/>
           <p:cNvSpPr>
             <a:spLocks noGrp="1"/>
           </p:cNvSpPr>
@@ -4508,22 +4873,19 @@
         </p:nvSpPr>
         <p:spPr/>
         <p:txBody>
-          <a:bodyPr/>
-          <a:lstStyle/>
-          <a:p>
-            <a:r>
-              <a:rPr lang="en-GB">
+          <a:bodyPr>
+            <a:normAutofit/>
+          </a:bodyPr>
+          <a:lstStyle/>
+          <a:p>
+            <a:r>
+              <a:rPr lang="en-GB" dirty="0">
                 <a:ea typeface="+mj-lt"/>
                 <a:cs typeface="+mj-lt"/>
               </a:rPr>
-              <a:t>Generating recipe with user prompt </a:t>
-            </a:r>
-            <a:endParaRPr lang="en-US">
-              <a:cs typeface="Calibri Light" panose="020F0302020204030204"/>
-            </a:endParaRPr>
-          </a:p>
-          <a:p>
-            <a:endParaRPr lang="en-GB">
+              <a:t>Overview of the system</a:t>
+            </a:r>
+            <a:endParaRPr lang="en-GB" dirty="0">
               <a:cs typeface="Calibri Light"/>
             </a:endParaRPr>
           </a:p>
@@ -4531,13 +4893,7 @@
       </p:sp>
       <p:sp>
         <p:nvSpPr>
-          <p:cNvPr id="3" name="Content Placeholder 2">
-            <a:extLst>
-              <a:ext uri="{FF2B5EF4-FFF2-40B4-BE49-F238E27FC236}">
-                <a16:creationId xmlns:a16="http://schemas.microsoft.com/office/drawing/2014/main" id="{50CBCE6E-BB4B-250B-6606-B740C1B2B1E0}"/>
-              </a:ext>
-            </a:extLst>
-          </p:cNvPr>
+          <p:cNvPr id="3" name="Subtitle 2"/>
           <p:cNvSpPr>
             <a:spLocks noGrp="1"/>
           </p:cNvSpPr>
@@ -4552,126 +4908,46 @@
           </a:bodyPr>
           <a:lstStyle/>
           <a:p>
-            <a:r>
-              <a:rPr lang="en-GB" sz="2400">
+            <a:pPr marL="342900" indent="-342900" algn="l">
+              <a:buChar char="•"/>
+            </a:pPr>
+            <a:r>
+              <a:rPr lang="en-GB" dirty="0">
+                <a:latin typeface="Calibri"/>
                 <a:ea typeface="+mn-lt"/>
-                <a:cs typeface="+mn-lt"/>
-              </a:rPr>
-              <a:t>Get user request</a:t>
-            </a:r>
-          </a:p>
-          <a:p>
-            <a:pPr lvl="1"/>
-            <a:r>
-              <a:rPr lang="en-GB" sz="2000">
+                <a:cs typeface="Times New Roman"/>
+              </a:rPr>
+              <a:t>The application can utilize an existing recipe database or it can generate the recipe directly using Azure OpenAI.</a:t>
+            </a:r>
+          </a:p>
+          <a:p>
+            <a:pPr marL="342900" indent="-342900"/>
+            <a:r>
+              <a:rPr lang="en-GB" dirty="0">
+                <a:latin typeface="Calibri"/>
                 <a:ea typeface="+mn-lt"/>
-                <a:cs typeface="+mn-lt"/>
-              </a:rPr>
-              <a:t>Text (All languages)</a:t>
-            </a:r>
-          </a:p>
-          <a:p>
-            <a:pPr lvl="1"/>
-            <a:r>
-              <a:rPr lang="en-GB" sz="2000">
+                <a:cs typeface="Times New Roman"/>
+              </a:rPr>
+              <a:t>It is able to get inputs as text or speech. The application leverages Azure Speech Service for text-to-speech operations.</a:t>
+            </a:r>
+          </a:p>
+          <a:p>
+            <a:pPr marL="342900" indent="-342900"/>
+            <a:r>
+              <a:rPr lang="en-GB" dirty="0">
+                <a:latin typeface="Calibri"/>
                 <a:ea typeface="+mn-lt"/>
-                <a:cs typeface="+mn-lt"/>
-              </a:rPr>
-              <a:t>Speech (English, German or Turkish)</a:t>
-            </a:r>
-          </a:p>
-          <a:p>
-            <a:r>
-              <a:rPr lang="en-GB" sz="2400">
-                <a:ea typeface="+mn-lt"/>
-                <a:cs typeface="+mn-lt"/>
-              </a:rPr>
-              <a:t>Language Detection (Both for Text and Speech input)</a:t>
-            </a:r>
-            <a:endParaRPr lang="en-GB" sz="2400">
-              <a:cs typeface="Calibri" panose="020F0502020204030204"/>
-            </a:endParaRPr>
-          </a:p>
-          <a:p>
-            <a:pPr lvl="1"/>
-            <a:r>
-              <a:rPr lang="en-GB" sz="2000">
-                <a:ea typeface="+mn-lt"/>
-                <a:cs typeface="+mn-lt"/>
-              </a:rPr>
-              <a:t>Used Azure OpenAI for text inputs, and '</a:t>
-            </a:r>
-            <a:r>
-              <a:rPr lang="en-GB" sz="2000" err="1">
-                <a:solidFill>
-                  <a:srgbClr val="161616"/>
-                </a:solidFill>
-                <a:ea typeface="+mn-lt"/>
-                <a:cs typeface="+mn-lt"/>
-              </a:rPr>
-              <a:t>AutoDetectSourceLanguageConfig</a:t>
-            </a:r>
-            <a:r>
-              <a:rPr lang="en-GB" sz="2000">
-                <a:solidFill>
-                  <a:srgbClr val="161616"/>
-                </a:solidFill>
-                <a:ea typeface="+mn-lt"/>
-                <a:cs typeface="+mn-lt"/>
-              </a:rPr>
-              <a:t>' for audio inputs</a:t>
-            </a:r>
-            <a:endParaRPr lang="en-GB" sz="2000" err="1">
-              <a:ea typeface="+mn-lt"/>
-              <a:cs typeface="+mn-lt"/>
-            </a:endParaRPr>
-          </a:p>
-          <a:p>
-            <a:endParaRPr lang="en-GB" sz="2400">
-              <a:cs typeface="Calibri"/>
-            </a:endParaRPr>
-          </a:p>
-          <a:p>
-            <a:endParaRPr lang="en-GB">
-              <a:cs typeface="Calibri"/>
-            </a:endParaRPr>
-          </a:p>
-        </p:txBody>
-      </p:sp>
-      <p:pic>
-        <p:nvPicPr>
-          <p:cNvPr id="4" name="Picture 3">
-            <a:extLst>
-              <a:ext uri="{FF2B5EF4-FFF2-40B4-BE49-F238E27FC236}">
-                <a16:creationId xmlns:a16="http://schemas.microsoft.com/office/drawing/2014/main" id="{7EC82525-66A4-84BC-30F5-50984BCD9642}"/>
-              </a:ext>
-            </a:extLst>
-          </p:cNvPr>
-          <p:cNvPicPr>
-            <a:picLocks noChangeAspect="1"/>
-          </p:cNvPicPr>
-          <p:nvPr/>
-        </p:nvPicPr>
-        <p:blipFill>
-          <a:blip r:embed="rId3"/>
-          <a:stretch>
-            <a:fillRect/>
-          </a:stretch>
-        </p:blipFill>
-        <p:spPr>
-          <a:xfrm>
-            <a:off x="2742249" y="3784879"/>
-            <a:ext cx="5301361" cy="3013776"/>
-          </a:xfrm>
-          <a:prstGeom prst="rect">
-            <a:avLst/>
-          </a:prstGeom>
-        </p:spPr>
-      </p:pic>
+                <a:cs typeface="Times New Roman"/>
+              </a:rPr>
+              <a:t>It supports multi language inputs.</a:t>
+            </a:r>
+          </a:p>
+        </p:txBody>
+      </p:sp>
     </p:spTree>
     <p:extLst>
       <p:ext uri="{BB962C8B-B14F-4D97-AF65-F5344CB8AC3E}">
-        <p14:creationId xmlns:p14="http://schemas.microsoft.com/office/powerpoint/2010/main" val="1949876876"/>
+        <p14:creationId xmlns:p14="http://schemas.microsoft.com/office/powerpoint/2010/main" val="3037889595"/>
       </p:ext>
     </p:extLst>
   </p:cSld>
@@ -4703,6 +4979,219 @@
           <p:cNvPr id="2" name="Title 1">
             <a:extLst>
               <a:ext uri="{FF2B5EF4-FFF2-40B4-BE49-F238E27FC236}">
+                <a16:creationId xmlns:a16="http://schemas.microsoft.com/office/drawing/2014/main" id="{96356158-6643-F75E-5146-4B31E5643F11}"/>
+              </a:ext>
+            </a:extLst>
+          </p:cNvPr>
+          <p:cNvSpPr>
+            <a:spLocks noGrp="1"/>
+          </p:cNvSpPr>
+          <p:nvPr>
+            <p:ph type="title"/>
+          </p:nvPr>
+        </p:nvSpPr>
+        <p:spPr/>
+        <p:txBody>
+          <a:bodyPr/>
+          <a:lstStyle/>
+          <a:p>
+            <a:r>
+              <a:rPr lang="en-GB" dirty="0">
+                <a:ea typeface="+mj-lt"/>
+                <a:cs typeface="+mj-lt"/>
+              </a:rPr>
+              <a:t>Generating recipe with user prompt</a:t>
+            </a:r>
+            <a:endParaRPr lang="en-GB" dirty="0">
+              <a:cs typeface="Calibri Light"/>
+            </a:endParaRPr>
+          </a:p>
+        </p:txBody>
+      </p:sp>
+      <p:sp>
+        <p:nvSpPr>
+          <p:cNvPr id="3" name="Content Placeholder 2">
+            <a:extLst>
+              <a:ext uri="{FF2B5EF4-FFF2-40B4-BE49-F238E27FC236}">
+                <a16:creationId xmlns:a16="http://schemas.microsoft.com/office/drawing/2014/main" id="{50CBCE6E-BB4B-250B-6606-B740C1B2B1E0}"/>
+              </a:ext>
+            </a:extLst>
+          </p:cNvPr>
+          <p:cNvSpPr>
+            <a:spLocks noGrp="1"/>
+          </p:cNvSpPr>
+          <p:nvPr>
+            <p:ph idx="1"/>
+          </p:nvPr>
+        </p:nvSpPr>
+        <p:spPr>
+          <a:xfrm>
+            <a:off x="838200" y="1303200"/>
+            <a:ext cx="4964120" cy="4896000"/>
+          </a:xfrm>
+        </p:spPr>
+        <p:txBody>
+          <a:bodyPr vert="horz" lIns="91440" tIns="45720" rIns="91440" bIns="45720" rtlCol="0" anchor="t">
+            <a:normAutofit/>
+          </a:bodyPr>
+          <a:lstStyle/>
+          <a:p>
+            <a:r>
+              <a:rPr lang="en-GB" sz="2400" dirty="0">
+                <a:ea typeface="+mn-lt"/>
+                <a:cs typeface="+mn-lt"/>
+              </a:rPr>
+              <a:t>Get user request</a:t>
+            </a:r>
+          </a:p>
+          <a:p>
+            <a:pPr lvl="1"/>
+            <a:r>
+              <a:rPr lang="en-GB" sz="2000" dirty="0">
+                <a:ea typeface="+mn-lt"/>
+                <a:cs typeface="+mn-lt"/>
+              </a:rPr>
+              <a:t>Text (All languages)</a:t>
+            </a:r>
+          </a:p>
+          <a:p>
+            <a:pPr lvl="1"/>
+            <a:r>
+              <a:rPr lang="en-GB" sz="2000" dirty="0">
+                <a:ea typeface="+mn-lt"/>
+                <a:cs typeface="+mn-lt"/>
+              </a:rPr>
+              <a:t>Speech (English, German or Turkish)</a:t>
+            </a:r>
+          </a:p>
+          <a:p>
+            <a:r>
+              <a:rPr lang="en-GB" sz="2400" dirty="0">
+                <a:ea typeface="+mn-lt"/>
+                <a:cs typeface="+mn-lt"/>
+              </a:rPr>
+              <a:t>Language Detection (Both for Text and Speech input)</a:t>
+            </a:r>
+            <a:endParaRPr lang="en-GB" sz="2400" dirty="0">
+              <a:cs typeface="Calibri" panose="020F0502020204030204"/>
+            </a:endParaRPr>
+          </a:p>
+          <a:p>
+            <a:pPr lvl="1"/>
+            <a:r>
+              <a:rPr lang="en-GB" sz="2000" dirty="0">
+                <a:ea typeface="+mn-lt"/>
+                <a:cs typeface="+mn-lt"/>
+              </a:rPr>
+              <a:t>Used Azure OpenAI for text inputs, and '</a:t>
+            </a:r>
+            <a:r>
+              <a:rPr lang="en-GB" sz="2000" dirty="0" err="1">
+                <a:solidFill>
+                  <a:srgbClr val="161616"/>
+                </a:solidFill>
+                <a:ea typeface="+mn-lt"/>
+                <a:cs typeface="+mn-lt"/>
+              </a:rPr>
+              <a:t>AutoDetectSourceLanguageConfig</a:t>
+            </a:r>
+            <a:r>
+              <a:rPr lang="en-GB" sz="2000" dirty="0">
+                <a:solidFill>
+                  <a:srgbClr val="161616"/>
+                </a:solidFill>
+                <a:ea typeface="+mn-lt"/>
+                <a:cs typeface="+mn-lt"/>
+              </a:rPr>
+              <a:t>' for audio inputs</a:t>
+            </a:r>
+            <a:endParaRPr lang="en-GB" sz="2000" dirty="0">
+              <a:ea typeface="+mn-lt"/>
+              <a:cs typeface="+mn-lt"/>
+            </a:endParaRPr>
+          </a:p>
+          <a:p>
+            <a:endParaRPr lang="en-GB" sz="2400" dirty="0">
+              <a:cs typeface="Calibri"/>
+            </a:endParaRPr>
+          </a:p>
+          <a:p>
+            <a:endParaRPr lang="en-GB" dirty="0">
+              <a:cs typeface="Calibri"/>
+            </a:endParaRPr>
+          </a:p>
+        </p:txBody>
+      </p:sp>
+      <p:pic>
+        <p:nvPicPr>
+          <p:cNvPr id="8" name="Picture 7">
+            <a:extLst>
+              <a:ext uri="{FF2B5EF4-FFF2-40B4-BE49-F238E27FC236}">
+                <a16:creationId xmlns:a16="http://schemas.microsoft.com/office/drawing/2014/main" id="{50A4652F-55FE-04A7-32D8-40DA23C1D446}"/>
+              </a:ext>
+            </a:extLst>
+          </p:cNvPr>
+          <p:cNvPicPr>
+            <a:picLocks noChangeAspect="1"/>
+          </p:cNvPicPr>
+          <p:nvPr/>
+        </p:nvPicPr>
+        <p:blipFill>
+          <a:blip r:embed="rId4"/>
+          <a:stretch>
+            <a:fillRect/>
+          </a:stretch>
+        </p:blipFill>
+        <p:spPr>
+          <a:xfrm>
+            <a:off x="6034761" y="1151468"/>
+            <a:ext cx="6157239" cy="5706532"/>
+          </a:xfrm>
+          <a:prstGeom prst="rect">
+            <a:avLst/>
+          </a:prstGeom>
+        </p:spPr>
+      </p:pic>
+    </p:spTree>
+    <p:extLst>
+      <p:ext uri="{BB962C8B-B14F-4D97-AF65-F5344CB8AC3E}">
+        <p14:creationId xmlns:p14="http://schemas.microsoft.com/office/powerpoint/2010/main" val="1949876876"/>
+      </p:ext>
+    </p:extLst>
+  </p:cSld>
+  <p:clrMapOvr>
+    <a:masterClrMapping/>
+  </p:clrMapOvr>
+  <p:extLst>
+    <p:ext uri="{6950BFC3-D8DA-4A85-94F7-54DA5524770B}">
+      <p188:commentRel xmlns:p188="http://schemas.microsoft.com/office/powerpoint/2018/8/main" r:id="rId3"/>
+    </p:ext>
+  </p:extLst>
+</p:sld>
+</file>
+
+<file path=ppt/slides/slide4.xml><?xml version="1.0" encoding="utf-8"?>
+<p:sld xmlns:a="http://schemas.openxmlformats.org/drawingml/2006/main" xmlns:r="http://schemas.openxmlformats.org/officeDocument/2006/relationships" xmlns:p="http://schemas.openxmlformats.org/presentationml/2006/main">
+  <p:cSld>
+    <p:spTree>
+      <p:nvGrpSpPr>
+        <p:cNvPr id="1" name=""/>
+        <p:cNvGrpSpPr/>
+        <p:nvPr/>
+      </p:nvGrpSpPr>
+      <p:grpSpPr>
+        <a:xfrm>
+          <a:off x="0" y="0"/>
+          <a:ext cx="0" cy="0"/>
+          <a:chOff x="0" y="0"/>
+          <a:chExt cx="0" cy="0"/>
+        </a:xfrm>
+      </p:grpSpPr>
+      <p:sp>
+        <p:nvSpPr>
+          <p:cNvPr id="2" name="Title 1">
+            <a:extLst>
+              <a:ext uri="{FF2B5EF4-FFF2-40B4-BE49-F238E27FC236}">
                 <a16:creationId xmlns:a16="http://schemas.microsoft.com/office/drawing/2014/main" id="{554CF0F3-D692-9C47-94B8-931ABF0614E7}"/>
               </a:ext>
             </a:extLst>
@@ -4714,26 +5203,19 @@
             <p:ph type="title"/>
           </p:nvPr>
         </p:nvSpPr>
-        <p:spPr>
-          <a:xfrm>
-            <a:off x="838200" y="365125"/>
-            <a:ext cx="10515600" cy="956109"/>
-          </a:xfrm>
-        </p:spPr>
+        <p:spPr/>
         <p:txBody>
           <a:bodyPr/>
           <a:lstStyle/>
           <a:p>
             <a:r>
-              <a:rPr lang="en-GB">
+              <a:rPr lang="en-GB" dirty="0">
                 <a:ea typeface="+mj-lt"/>
                 <a:cs typeface="+mj-lt"/>
               </a:rPr>
-              <a:t>Generating recipe with user prompt </a:t>
-            </a:r>
-          </a:p>
-          <a:p>
-            <a:endParaRPr lang="en-GB">
+              <a:t>Generating recipe with user prompt</a:t>
+            </a:r>
+            <a:endParaRPr lang="en-GB" dirty="0">
               <a:ea typeface="Calibri Light"/>
               <a:cs typeface="Calibri Light"/>
             </a:endParaRPr>
@@ -4756,26 +5238,21 @@
             <p:ph idx="1"/>
           </p:nvPr>
         </p:nvSpPr>
-        <p:spPr>
-          <a:xfrm>
-            <a:off x="838200" y="1254125"/>
-            <a:ext cx="10515600" cy="1728047"/>
-          </a:xfrm>
-        </p:spPr>
+        <p:spPr/>
         <p:txBody>
           <a:bodyPr vert="horz" lIns="91440" tIns="45720" rIns="91440" bIns="45720" rtlCol="0" anchor="t">
-            <a:normAutofit lnSpcReduction="10000"/>
+            <a:normAutofit/>
           </a:bodyPr>
           <a:lstStyle/>
           <a:p>
             <a:r>
-              <a:rPr lang="en-GB" sz="2400">
+              <a:rPr lang="en-GB" sz="2400" dirty="0">
                 <a:ea typeface="+mn-lt"/>
                 <a:cs typeface="+mn-lt"/>
               </a:rPr>
               <a:t>After getting input from user (Speech or Text):</a:t>
             </a:r>
-            <a:endParaRPr lang="en-GB" sz="2400">
+            <a:endParaRPr lang="en-GB" sz="2400" dirty="0">
               <a:ea typeface="Calibri" panose="020F0502020204030204"/>
               <a:cs typeface="Calibri" panose="020F0502020204030204"/>
             </a:endParaRPr>
@@ -4783,41 +5260,41 @@
           <a:p>
             <a:pPr lvl="1"/>
             <a:r>
-              <a:rPr lang="en-GB" sz="2000">
+              <a:rPr lang="en-GB" sz="2000" dirty="0">
                 <a:ea typeface="+mn-lt"/>
                 <a:cs typeface="+mn-lt"/>
               </a:rPr>
               <a:t>Clean </a:t>
             </a:r>
             <a:r>
-              <a:rPr lang="en-GB" sz="2000" b="1">
+              <a:rPr lang="en-GB" sz="2000" b="1" dirty="0">
                 <a:ea typeface="+mn-lt"/>
                 <a:cs typeface="+mn-lt"/>
               </a:rPr>
               <a:t>‘Dish Name’</a:t>
             </a:r>
             <a:r>
-              <a:rPr lang="en-GB" sz="2000">
+              <a:rPr lang="en-GB" sz="2000" dirty="0">
                 <a:ea typeface="+mn-lt"/>
                 <a:cs typeface="+mn-lt"/>
               </a:rPr>
               <a:t> / </a:t>
             </a:r>
             <a:r>
-              <a:rPr lang="en-GB" sz="2000" b="1">
+              <a:rPr lang="en-GB" sz="2000" b="1" dirty="0">
                 <a:ea typeface="+mn-lt"/>
                 <a:cs typeface="+mn-lt"/>
               </a:rPr>
               <a:t>'Serving Count’</a:t>
             </a:r>
             <a:r>
-              <a:rPr lang="en-GB" sz="2000">
+              <a:rPr lang="en-GB" sz="2000" dirty="0">
                 <a:ea typeface="+mn-lt"/>
                 <a:cs typeface="+mn-lt"/>
               </a:rPr>
               <a:t> from the input sentence</a:t>
             </a:r>
-            <a:endParaRPr lang="en-GB" sz="2000">
+            <a:endParaRPr lang="en-GB" sz="2000" dirty="0">
               <a:ea typeface="Calibri"/>
               <a:cs typeface="Calibri"/>
             </a:endParaRPr>
@@ -4825,52 +5302,52 @@
           <a:p>
             <a:pPr lvl="1"/>
             <a:r>
-              <a:rPr lang="en-GB" sz="2000">
+              <a:rPr lang="en-GB" sz="2000" dirty="0">
                 <a:ea typeface="+mn-lt"/>
                 <a:cs typeface="+mn-lt"/>
               </a:rPr>
               <a:t>Double check with Azure OpenAI</a:t>
             </a:r>
-            <a:endParaRPr lang="en-GB" sz="2000"/>
+            <a:endParaRPr lang="en-GB" sz="2000" dirty="0"/>
           </a:p>
           <a:p>
             <a:pPr lvl="2"/>
             <a:r>
-              <a:rPr lang="en-GB" sz="1800">
+              <a:rPr lang="en-GB" sz="1800" dirty="0">
                 <a:ea typeface="+mn-lt"/>
                 <a:cs typeface="+mn-lt"/>
               </a:rPr>
               <a:t>If the </a:t>
             </a:r>
             <a:r>
-              <a:rPr lang="en-GB" sz="1800" b="1">
+              <a:rPr lang="en-GB" sz="1800" b="1" dirty="0">
                 <a:ea typeface="+mn-lt"/>
                 <a:cs typeface="+mn-lt"/>
               </a:rPr>
               <a:t>‘Dish Name’ </a:t>
             </a:r>
             <a:r>
-              <a:rPr lang="en-GB" sz="1800">
+              <a:rPr lang="en-GB" sz="1800" dirty="0">
                 <a:ea typeface="+mn-lt"/>
                 <a:cs typeface="+mn-lt"/>
               </a:rPr>
               <a:t>or </a:t>
             </a:r>
             <a:r>
-              <a:rPr lang="en-GB" sz="1800" b="1">
+              <a:rPr lang="en-GB" sz="1800" b="1" dirty="0">
                 <a:ea typeface="+mn-lt"/>
                 <a:cs typeface="+mn-lt"/>
               </a:rPr>
               <a:t>'Serving Count’ </a:t>
             </a:r>
             <a:r>
-              <a:rPr lang="en-GB" sz="1800">
+              <a:rPr lang="en-GB" sz="1800" dirty="0">
                 <a:ea typeface="+mn-lt"/>
                 <a:cs typeface="+mn-lt"/>
               </a:rPr>
               <a:t>is valid or not</a:t>
             </a:r>
-            <a:endParaRPr lang="en-GB" sz="1800">
+            <a:endParaRPr lang="en-GB" sz="1800" dirty="0">
               <a:ea typeface="Calibri"/>
               <a:cs typeface="Calibri"/>
             </a:endParaRPr>
@@ -4878,19 +5355,19 @@
           <a:p>
             <a:pPr lvl="1"/>
             <a:r>
-              <a:rPr lang="en-GB" sz="2000">
+              <a:rPr lang="en-GB" sz="2000" dirty="0">
                 <a:ea typeface="+mn-lt"/>
                 <a:cs typeface="+mn-lt"/>
               </a:rPr>
               <a:t>If pass both tests forward inputs to the ‘Recipe Generator’, otherwise ask invalid ones </a:t>
             </a:r>
-            <a:endParaRPr lang="en-GB" sz="2000">
+            <a:endParaRPr lang="en-GB" sz="2000" dirty="0">
               <a:ea typeface="Calibri"/>
               <a:cs typeface="Calibri"/>
             </a:endParaRPr>
           </a:p>
           <a:p>
-            <a:endParaRPr lang="en-GB">
+            <a:endParaRPr lang="en-GB" dirty="0">
               <a:ea typeface="Calibri"/>
               <a:cs typeface="Calibri"/>
             </a:endParaRPr>
@@ -4912,7 +5389,7 @@
           <p:nvPr/>
         </p:nvPicPr>
         <p:blipFill>
-          <a:blip r:embed="rId3"/>
+          <a:blip r:embed="rId4"/>
           <a:stretch>
             <a:fillRect/>
           </a:stretch>
@@ -4942,7 +5419,7 @@
           <p:nvPr/>
         </p:nvPicPr>
         <p:blipFill>
-          <a:blip r:embed="rId4"/>
+          <a:blip r:embed="rId5"/>
           <a:stretch>
             <a:fillRect/>
           </a:stretch>
@@ -4972,7 +5449,7 @@
           <p:nvPr/>
         </p:nvPicPr>
         <p:blipFill>
-          <a:blip r:embed="rId5"/>
+          <a:blip r:embed="rId6"/>
           <a:stretch>
             <a:fillRect/>
           </a:stretch>
@@ -5002,7 +5479,7 @@
           <p:nvPr/>
         </p:nvPicPr>
         <p:blipFill>
-          <a:blip r:embed="rId6"/>
+          <a:blip r:embed="rId7"/>
           <a:stretch>
             <a:fillRect/>
           </a:stretch>
@@ -5027,10 +5504,15 @@
   <p:clrMapOvr>
     <a:masterClrMapping/>
   </p:clrMapOvr>
+  <p:extLst>
+    <p:ext uri="{6950BFC3-D8DA-4A85-94F7-54DA5524770B}">
+      <p188:commentRel xmlns:p188="http://schemas.microsoft.com/office/powerpoint/2018/8/main" r:id="rId3"/>
+    </p:ext>
+  </p:extLst>
 </p:sld>
 </file>
 
-<file path=ppt/slides/slide4.xml><?xml version="1.0" encoding="utf-8"?>
+<file path=ppt/slides/slide5.xml><?xml version="1.0" encoding="utf-8"?>
 <p:sld xmlns:a="http://schemas.openxmlformats.org/drawingml/2006/main" xmlns:r="http://schemas.openxmlformats.org/officeDocument/2006/relationships" xmlns:p="http://schemas.openxmlformats.org/presentationml/2006/main">
   <p:cSld>
     <p:spTree>
@@ -5069,13 +5551,13 @@
           <a:lstStyle/>
           <a:p>
             <a:r>
-              <a:rPr lang="en-GB">
+              <a:rPr lang="en-GB" dirty="0">
                 <a:ea typeface="+mj-lt"/>
                 <a:cs typeface="+mj-lt"/>
               </a:rPr>
               <a:t>Performance and Cost</a:t>
             </a:r>
-            <a:endParaRPr lang="en-US"/>
+            <a:endParaRPr lang="en-US" dirty="0"/>
           </a:p>
         </p:txBody>
       </p:sp>
@@ -5095,12 +5577,7 @@
             <p:ph idx="1"/>
           </p:nvPr>
         </p:nvSpPr>
-        <p:spPr>
-          <a:xfrm>
-            <a:off x="838200" y="1825625"/>
-            <a:ext cx="10515600" cy="2527157"/>
-          </a:xfrm>
-        </p:spPr>
+        <p:spPr/>
         <p:txBody>
           <a:bodyPr vert="horz" lIns="91440" tIns="45720" rIns="91440" bIns="45720" rtlCol="0" anchor="t">
             <a:normAutofit/>
@@ -5108,26 +5585,26 @@
           <a:lstStyle/>
           <a:p>
             <a:r>
-              <a:rPr lang="en-GB" sz="2400">
+              <a:rPr lang="en-GB" sz="2400" dirty="0">
                 <a:ea typeface="+mn-lt"/>
                 <a:cs typeface="+mn-lt"/>
               </a:rPr>
               <a:t>We ran unit tests for duration and cost. </a:t>
             </a:r>
-            <a:endParaRPr lang="en-GB" sz="2400">
+            <a:endParaRPr lang="en-GB" sz="2400" dirty="0">
               <a:ea typeface="Calibri" panose="020F0502020204030204"/>
               <a:cs typeface="Calibri" panose="020F0502020204030204"/>
             </a:endParaRPr>
           </a:p>
           <a:p>
             <a:r>
-              <a:rPr lang="en-GB" sz="2400">
+              <a:rPr lang="en-GB" sz="2400" dirty="0">
                 <a:ea typeface="+mn-lt"/>
                 <a:cs typeface="+mn-lt"/>
               </a:rPr>
               <a:t>Test configurations:</a:t>
             </a:r>
-            <a:endParaRPr lang="en-GB" sz="2400">
+            <a:endParaRPr lang="en-GB" sz="2400" dirty="0">
               <a:ea typeface="Calibri"/>
               <a:cs typeface="Calibri"/>
             </a:endParaRPr>
@@ -5135,13 +5612,13 @@
           <a:p>
             <a:pPr lvl="1"/>
             <a:r>
-              <a:rPr lang="en-GB" sz="2000">
+              <a:rPr lang="en-GB" sz="2000" dirty="0">
                 <a:ea typeface="+mn-lt"/>
                 <a:cs typeface="+mn-lt"/>
               </a:rPr>
               <a:t>3 languages: English, German and Turkish</a:t>
             </a:r>
-            <a:endParaRPr lang="en-GB" sz="2000">
+            <a:endParaRPr lang="en-GB" sz="2000" dirty="0">
               <a:ea typeface="Calibri"/>
               <a:cs typeface="Calibri"/>
             </a:endParaRPr>
@@ -5149,13 +5626,13 @@
           <a:p>
             <a:pPr lvl="1"/>
             <a:r>
-              <a:rPr lang="en-GB" sz="2000">
+              <a:rPr lang="en-GB" sz="2000" dirty="0">
                 <a:ea typeface="+mn-lt"/>
                 <a:cs typeface="+mn-lt"/>
               </a:rPr>
               <a:t>Dish Name and Serving Count tests </a:t>
             </a:r>
-            <a:endParaRPr lang="en-GB" sz="2000">
+            <a:endParaRPr lang="en-GB" sz="2000" dirty="0">
               <a:ea typeface="Calibri"/>
               <a:cs typeface="Calibri"/>
             </a:endParaRPr>
@@ -5163,13 +5640,13 @@
           <a:p>
             <a:pPr lvl="1"/>
             <a:r>
-              <a:rPr lang="en-GB" sz="2000">
+              <a:rPr lang="en-GB" sz="2000" dirty="0">
                 <a:ea typeface="+mn-lt"/>
                 <a:cs typeface="+mn-lt"/>
               </a:rPr>
               <a:t>Language detection and double check (‘Type Check’) parts are also done with these 3 languages</a:t>
             </a:r>
-            <a:endParaRPr lang="en-GB" sz="2000">
+            <a:endParaRPr lang="en-GB" sz="2000" dirty="0">
               <a:ea typeface="Calibri"/>
               <a:cs typeface="Calibri"/>
             </a:endParaRPr>
@@ -5177,16 +5654,16 @@
           <a:p>
             <a:pPr lvl="1"/>
             <a:r>
-              <a:rPr lang="en-GB" sz="2000">
+              <a:rPr lang="en-GB" sz="2000" dirty="0">
                 <a:ea typeface="+mn-lt"/>
                 <a:cs typeface="+mn-lt"/>
               </a:rPr>
               <a:t>Generate Recipe tests for creating items-quantities from 'Dish Name' and 'Serving Counts'</a:t>
             </a:r>
-            <a:endParaRPr lang="en-GB" sz="2000"/>
-          </a:p>
-          <a:p>
-            <a:endParaRPr lang="en-GB">
+            <a:endParaRPr lang="en-GB" sz="2000" dirty="0"/>
+          </a:p>
+          <a:p>
+            <a:endParaRPr lang="en-GB" dirty="0">
               <a:ea typeface="Calibri"/>
               <a:cs typeface="Calibri"/>
             </a:endParaRPr>
@@ -5208,7 +5685,7 @@
           <p:nvPr/>
         </p:nvPicPr>
         <p:blipFill>
-          <a:blip r:embed="rId3"/>
+          <a:blip r:embed="rId4"/>
           <a:stretch>
             <a:fillRect/>
           </a:stretch>
@@ -5233,10 +5710,15 @@
   <p:clrMapOvr>
     <a:masterClrMapping/>
   </p:clrMapOvr>
+  <p:extLst>
+    <p:ext uri="{6950BFC3-D8DA-4A85-94F7-54DA5524770B}">
+      <p188:commentRel xmlns:p188="http://schemas.microsoft.com/office/powerpoint/2018/8/main" r:id="rId3"/>
+    </p:ext>
+  </p:extLst>
 </p:sld>
 </file>
 
-<file path=ppt/slides/slide5.xml><?xml version="1.0" encoding="utf-8"?>
+<file path=ppt/slides/slide6.xml><?xml version="1.0" encoding="utf-8"?>
 <p:sld xmlns:a="http://schemas.openxmlformats.org/drawingml/2006/main" xmlns:r="http://schemas.openxmlformats.org/officeDocument/2006/relationships" xmlns:p="http://schemas.openxmlformats.org/presentationml/2006/main">
   <p:cSld>
     <p:spTree>
@@ -5348,7 +5830,7 @@
               </a:rPr>
               <a:t>Azure OpenAI usage</a:t>
             </a:r>
-            <a:endParaRPr lang="en-GB" sz="1600" b="1">
+            <a:endParaRPr lang="en-GB" sz="1600" b="1" dirty="0">
               <a:ea typeface="Calibri"/>
               <a:cs typeface="Calibri"/>
             </a:endParaRPr>
@@ -5379,7 +5861,7 @@
               </a:rPr>
               <a:t> per month (F0)</a:t>
             </a:r>
-            <a:endParaRPr lang="en-GB" sz="1600">
+            <a:endParaRPr lang="en-GB" sz="1600" dirty="0">
               <a:ea typeface="Calibri"/>
               <a:cs typeface="Calibri"/>
             </a:endParaRPr>
@@ -5410,7 +5892,7 @@
               </a:rPr>
               <a:t> for both ‘Dish Name’ and ‘Serving Count’ inputs (First Checks)</a:t>
             </a:r>
-            <a:endParaRPr lang="en-GB" sz="1600">
+            <a:endParaRPr lang="en-GB" sz="1600" dirty="0">
               <a:ea typeface="Calibri"/>
               <a:cs typeface="Calibri"/>
             </a:endParaRPr>
@@ -5596,6 +6078,11 @@
   <p:clrMapOvr>
     <a:masterClrMapping/>
   </p:clrMapOvr>
+  <p:extLst>
+    <p:ext uri="{6950BFC3-D8DA-4A85-94F7-54DA5524770B}">
+      <p188:commentRel xmlns:p188="http://schemas.microsoft.com/office/powerpoint/2018/8/main" r:id="rId3"/>
+    </p:ext>
+  </p:extLst>
 </p:sld>
 </file>
 

</xml_diff>